<commit_message>
final ppt version commited
</commit_message>
<xml_diff>
--- a/doc/Powerpoint_CrowdAss.pptx
+++ b/doc/Powerpoint_CrowdAss.pptx
@@ -930,11 +930,7 @@
           </a:r>
           <a:r>
             <a:rPr lang="en-US" sz="2300" b="1" dirty="0" smtClean="0"/>
-            <a:t> </a:t>
-          </a:r>
-          <a:r>
-            <a:rPr lang="en-US" sz="2300" b="1" dirty="0" smtClean="0"/>
-            <a:t>or </a:t>
+            <a:t> or </a:t>
           </a:r>
           <a:r>
             <a:rPr lang="en-US" sz="2300" b="1" dirty="0" err="1" smtClean="0"/>
@@ -942,11 +938,7 @@
           </a:r>
           <a:r>
             <a:rPr lang="en-US" sz="2300" b="1" dirty="0" smtClean="0"/>
-            <a:t> via </a:t>
-          </a:r>
-          <a:r>
-            <a:rPr lang="en-US" sz="2300" b="1" dirty="0" smtClean="0"/>
-            <a:t>their APIs</a:t>
+            <a:t> via their APIs</a:t>
           </a:r>
           <a:endParaRPr lang="en-US" sz="2300" b="1" dirty="0"/>
         </a:p>
@@ -1060,6 +1052,13 @@
         </dgm:presLayoutVars>
       </dgm:prSet>
       <dgm:spPr/>
+      <dgm:t>
+        <a:bodyPr/>
+        <a:lstStyle/>
+        <a:p>
+          <a:endParaRPr lang="en-US"/>
+        </a:p>
+      </dgm:t>
     </dgm:pt>
     <dgm:pt modelId="{6F5EE12A-110A-4614-8F60-BE5160D6B65A}" type="pres">
       <dgm:prSet presAssocID="{6F121CE4-2F44-4771-8CDD-9F34CC46D152}" presName="node" presStyleLbl="node1" presStyleIdx="0" presStyleCnt="4" custScaleY="187043">
@@ -1068,14 +1067,35 @@
         </dgm:presLayoutVars>
       </dgm:prSet>
       <dgm:spPr/>
+      <dgm:t>
+        <a:bodyPr/>
+        <a:lstStyle/>
+        <a:p>
+          <a:endParaRPr lang="en-US"/>
+        </a:p>
+      </dgm:t>
     </dgm:pt>
     <dgm:pt modelId="{E4FCC6C0-D3B3-4A69-A538-E99289A5F274}" type="pres">
       <dgm:prSet presAssocID="{DB724159-90F2-4184-BA18-7CA8CA0FE469}" presName="sibTrans" presStyleLbl="sibTrans2D1" presStyleIdx="0" presStyleCnt="3"/>
       <dgm:spPr/>
+      <dgm:t>
+        <a:bodyPr/>
+        <a:lstStyle/>
+        <a:p>
+          <a:endParaRPr lang="en-US"/>
+        </a:p>
+      </dgm:t>
     </dgm:pt>
     <dgm:pt modelId="{8B7D0674-F626-4FB2-B1BB-2BEC95EBE3A8}" type="pres">
       <dgm:prSet presAssocID="{DB724159-90F2-4184-BA18-7CA8CA0FE469}" presName="connectorText" presStyleLbl="sibTrans2D1" presStyleIdx="0" presStyleCnt="3"/>
       <dgm:spPr/>
+      <dgm:t>
+        <a:bodyPr/>
+        <a:lstStyle/>
+        <a:p>
+          <a:endParaRPr lang="en-US"/>
+        </a:p>
+      </dgm:t>
     </dgm:pt>
     <dgm:pt modelId="{90C93F14-4237-470D-B7FB-738E6B5A8B13}" type="pres">
       <dgm:prSet presAssocID="{675AC71D-A21A-45B2-9800-7B2606181B4E}" presName="node" presStyleLbl="node1" presStyleIdx="1" presStyleCnt="4" custScaleY="187043">
@@ -1095,10 +1115,24 @@
     <dgm:pt modelId="{1F3CA1AF-5A36-4EA7-979A-CDE66C2D9DA8}" type="pres">
       <dgm:prSet presAssocID="{A713D569-3E22-425B-B49E-AD50A08CA262}" presName="sibTrans" presStyleLbl="sibTrans2D1" presStyleIdx="1" presStyleCnt="3"/>
       <dgm:spPr/>
+      <dgm:t>
+        <a:bodyPr/>
+        <a:lstStyle/>
+        <a:p>
+          <a:endParaRPr lang="en-US"/>
+        </a:p>
+      </dgm:t>
     </dgm:pt>
     <dgm:pt modelId="{0420FF33-BAB6-4397-BAE2-CE717C8BD309}" type="pres">
       <dgm:prSet presAssocID="{A713D569-3E22-425B-B49E-AD50A08CA262}" presName="connectorText" presStyleLbl="sibTrans2D1" presStyleIdx="1" presStyleCnt="3"/>
       <dgm:spPr/>
+      <dgm:t>
+        <a:bodyPr/>
+        <a:lstStyle/>
+        <a:p>
+          <a:endParaRPr lang="en-US"/>
+        </a:p>
+      </dgm:t>
     </dgm:pt>
     <dgm:pt modelId="{29E73685-2DCE-44FC-B8A6-5402DAD439AC}" type="pres">
       <dgm:prSet presAssocID="{C9858D0F-31A7-4E5D-B415-1CC9C3DA2931}" presName="node" presStyleLbl="node1" presStyleIdx="2" presStyleCnt="4" custScaleY="187043">
@@ -1107,14 +1141,35 @@
         </dgm:presLayoutVars>
       </dgm:prSet>
       <dgm:spPr/>
+      <dgm:t>
+        <a:bodyPr/>
+        <a:lstStyle/>
+        <a:p>
+          <a:endParaRPr lang="en-US"/>
+        </a:p>
+      </dgm:t>
     </dgm:pt>
     <dgm:pt modelId="{709D670C-84D9-4ACF-8DB8-A6EA2561E1B3}" type="pres">
       <dgm:prSet presAssocID="{D3C06B21-EC9A-415A-B37B-BDD05C6BBF29}" presName="sibTrans" presStyleLbl="sibTrans2D1" presStyleIdx="2" presStyleCnt="3"/>
       <dgm:spPr/>
+      <dgm:t>
+        <a:bodyPr/>
+        <a:lstStyle/>
+        <a:p>
+          <a:endParaRPr lang="en-US"/>
+        </a:p>
+      </dgm:t>
     </dgm:pt>
     <dgm:pt modelId="{DD00318C-D1DC-4797-A508-3D301E22426F}" type="pres">
       <dgm:prSet presAssocID="{D3C06B21-EC9A-415A-B37B-BDD05C6BBF29}" presName="connectorText" presStyleLbl="sibTrans2D1" presStyleIdx="2" presStyleCnt="3"/>
       <dgm:spPr/>
+      <dgm:t>
+        <a:bodyPr/>
+        <a:lstStyle/>
+        <a:p>
+          <a:endParaRPr lang="en-US"/>
+        </a:p>
+      </dgm:t>
     </dgm:pt>
     <dgm:pt modelId="{0A9D6BA0-CF77-4F93-A398-4C6D64715868}" type="pres">
       <dgm:prSet presAssocID="{3B4496F0-D764-45E8-9640-E5D12051263E}" presName="node" presStyleLbl="node1" presStyleIdx="3" presStyleCnt="4" custScaleY="187043">
@@ -1123,24 +1178,31 @@
         </dgm:presLayoutVars>
       </dgm:prSet>
       <dgm:spPr/>
+      <dgm:t>
+        <a:bodyPr/>
+        <a:lstStyle/>
+        <a:p>
+          <a:endParaRPr lang="en-US"/>
+        </a:p>
+      </dgm:t>
     </dgm:pt>
   </dgm:ptLst>
   <dgm:cxnLst>
+    <dgm:cxn modelId="{2B012D00-A711-4428-ADC6-9F2904B6D5A1}" type="presOf" srcId="{DB724159-90F2-4184-BA18-7CA8CA0FE469}" destId="{8B7D0674-F626-4FB2-B1BB-2BEC95EBE3A8}" srcOrd="1" destOrd="0" presId="urn:microsoft.com/office/officeart/2005/8/layout/process1"/>
+    <dgm:cxn modelId="{D20D7569-2699-4379-ACD3-AD0308989736}" srcId="{9778B2AF-6EE1-4E17-B9AA-D2699DBDE648}" destId="{C9858D0F-31A7-4E5D-B415-1CC9C3DA2931}" srcOrd="2" destOrd="0" parTransId="{3B7048F8-EA34-49DA-AA9A-1DBA2A67B65C}" sibTransId="{D3C06B21-EC9A-415A-B37B-BDD05C6BBF29}"/>
+    <dgm:cxn modelId="{F9D26011-68BB-4463-8705-A74E44FCB211}" type="presOf" srcId="{675AC71D-A21A-45B2-9800-7B2606181B4E}" destId="{90C93F14-4237-470D-B7FB-738E6B5A8B13}" srcOrd="0" destOrd="0" presId="urn:microsoft.com/office/officeart/2005/8/layout/process1"/>
+    <dgm:cxn modelId="{032C99CC-10A8-4D09-909C-219FC362C95A}" type="presOf" srcId="{9778B2AF-6EE1-4E17-B9AA-D2699DBDE648}" destId="{C1C8B983-A91C-40B0-AA22-24B5A517ACC7}" srcOrd="0" destOrd="0" presId="urn:microsoft.com/office/officeart/2005/8/layout/process1"/>
+    <dgm:cxn modelId="{054E81FC-9F9B-4650-B0DA-4AC243021492}" type="presOf" srcId="{6F121CE4-2F44-4771-8CDD-9F34CC46D152}" destId="{6F5EE12A-110A-4614-8F60-BE5160D6B65A}" srcOrd="0" destOrd="0" presId="urn:microsoft.com/office/officeart/2005/8/layout/process1"/>
+    <dgm:cxn modelId="{24E3ED7C-D6A6-4F89-9E02-CDC50FA7DA9B}" srcId="{9778B2AF-6EE1-4E17-B9AA-D2699DBDE648}" destId="{675AC71D-A21A-45B2-9800-7B2606181B4E}" srcOrd="1" destOrd="0" parTransId="{436C6FE4-D546-48B0-8295-80966DDFC2CB}" sibTransId="{A713D569-3E22-425B-B49E-AD50A08CA262}"/>
+    <dgm:cxn modelId="{EFDD5FC7-90A1-441B-BDCC-97F0E404D852}" srcId="{9778B2AF-6EE1-4E17-B9AA-D2699DBDE648}" destId="{6F121CE4-2F44-4771-8CDD-9F34CC46D152}" srcOrd="0" destOrd="0" parTransId="{B7993B56-BB37-40E2-B67D-04080561C157}" sibTransId="{DB724159-90F2-4184-BA18-7CA8CA0FE469}"/>
+    <dgm:cxn modelId="{4C4D9E9C-25D4-473B-8E94-8ECC51ADEF7C}" type="presOf" srcId="{A713D569-3E22-425B-B49E-AD50A08CA262}" destId="{1F3CA1AF-5A36-4EA7-979A-CDE66C2D9DA8}" srcOrd="0" destOrd="0" presId="urn:microsoft.com/office/officeart/2005/8/layout/process1"/>
     <dgm:cxn modelId="{F751A391-9032-46E2-87D8-214E5066B10F}" type="presOf" srcId="{D3C06B21-EC9A-415A-B37B-BDD05C6BBF29}" destId="{709D670C-84D9-4ACF-8DB8-A6EA2561E1B3}" srcOrd="0" destOrd="0" presId="urn:microsoft.com/office/officeart/2005/8/layout/process1"/>
+    <dgm:cxn modelId="{45914C3B-79E6-49A9-B32E-7F4BC68649F9}" srcId="{9778B2AF-6EE1-4E17-B9AA-D2699DBDE648}" destId="{3B4496F0-D764-45E8-9640-E5D12051263E}" srcOrd="3" destOrd="0" parTransId="{48581A19-1619-4C20-A3A2-5F550FF7847C}" sibTransId="{4DEF1C4B-F672-4C94-B15E-312ECF68CDC4}"/>
+    <dgm:cxn modelId="{2239FB5E-4B05-4800-8F2E-8B72A1C9DBAC}" type="presOf" srcId="{A713D569-3E22-425B-B49E-AD50A08CA262}" destId="{0420FF33-BAB6-4397-BAE2-CE717C8BD309}" srcOrd="1" destOrd="0" presId="urn:microsoft.com/office/officeart/2005/8/layout/process1"/>
     <dgm:cxn modelId="{7939FE43-3AE0-4D54-9DCC-8BB745C14F72}" type="presOf" srcId="{DB724159-90F2-4184-BA18-7CA8CA0FE469}" destId="{E4FCC6C0-D3B3-4A69-A538-E99289A5F274}" srcOrd="0" destOrd="0" presId="urn:microsoft.com/office/officeart/2005/8/layout/process1"/>
     <dgm:cxn modelId="{DC309ABE-255C-44C6-8269-E9506D85F002}" type="presOf" srcId="{3B4496F0-D764-45E8-9640-E5D12051263E}" destId="{0A9D6BA0-CF77-4F93-A398-4C6D64715868}" srcOrd="0" destOrd="0" presId="urn:microsoft.com/office/officeart/2005/8/layout/process1"/>
-    <dgm:cxn modelId="{054E81FC-9F9B-4650-B0DA-4AC243021492}" type="presOf" srcId="{6F121CE4-2F44-4771-8CDD-9F34CC46D152}" destId="{6F5EE12A-110A-4614-8F60-BE5160D6B65A}" srcOrd="0" destOrd="0" presId="urn:microsoft.com/office/officeart/2005/8/layout/process1"/>
+    <dgm:cxn modelId="{A55358FD-6475-48C2-AFC2-8D23D66DCE1A}" type="presOf" srcId="{C9858D0F-31A7-4E5D-B415-1CC9C3DA2931}" destId="{29E73685-2DCE-44FC-B8A6-5402DAD439AC}" srcOrd="0" destOrd="0" presId="urn:microsoft.com/office/officeart/2005/8/layout/process1"/>
     <dgm:cxn modelId="{1689FD2C-5A9F-4D8F-818F-FF365BFF3250}" type="presOf" srcId="{D3C06B21-EC9A-415A-B37B-BDD05C6BBF29}" destId="{DD00318C-D1DC-4797-A508-3D301E22426F}" srcOrd="1" destOrd="0" presId="urn:microsoft.com/office/officeart/2005/8/layout/process1"/>
-    <dgm:cxn modelId="{D20D7569-2699-4379-ACD3-AD0308989736}" srcId="{9778B2AF-6EE1-4E17-B9AA-D2699DBDE648}" destId="{C9858D0F-31A7-4E5D-B415-1CC9C3DA2931}" srcOrd="2" destOrd="0" parTransId="{3B7048F8-EA34-49DA-AA9A-1DBA2A67B65C}" sibTransId="{D3C06B21-EC9A-415A-B37B-BDD05C6BBF29}"/>
-    <dgm:cxn modelId="{45914C3B-79E6-49A9-B32E-7F4BC68649F9}" srcId="{9778B2AF-6EE1-4E17-B9AA-D2699DBDE648}" destId="{3B4496F0-D764-45E8-9640-E5D12051263E}" srcOrd="3" destOrd="0" parTransId="{48581A19-1619-4C20-A3A2-5F550FF7847C}" sibTransId="{4DEF1C4B-F672-4C94-B15E-312ECF68CDC4}"/>
-    <dgm:cxn modelId="{2239FB5E-4B05-4800-8F2E-8B72A1C9DBAC}" type="presOf" srcId="{A713D569-3E22-425B-B49E-AD50A08CA262}" destId="{0420FF33-BAB6-4397-BAE2-CE717C8BD309}" srcOrd="1" destOrd="0" presId="urn:microsoft.com/office/officeart/2005/8/layout/process1"/>
-    <dgm:cxn modelId="{032C99CC-10A8-4D09-909C-219FC362C95A}" type="presOf" srcId="{9778B2AF-6EE1-4E17-B9AA-D2699DBDE648}" destId="{C1C8B983-A91C-40B0-AA22-24B5A517ACC7}" srcOrd="0" destOrd="0" presId="urn:microsoft.com/office/officeart/2005/8/layout/process1"/>
-    <dgm:cxn modelId="{2B012D00-A711-4428-ADC6-9F2904B6D5A1}" type="presOf" srcId="{DB724159-90F2-4184-BA18-7CA8CA0FE469}" destId="{8B7D0674-F626-4FB2-B1BB-2BEC95EBE3A8}" srcOrd="1" destOrd="0" presId="urn:microsoft.com/office/officeart/2005/8/layout/process1"/>
-    <dgm:cxn modelId="{F9D26011-68BB-4463-8705-A74E44FCB211}" type="presOf" srcId="{675AC71D-A21A-45B2-9800-7B2606181B4E}" destId="{90C93F14-4237-470D-B7FB-738E6B5A8B13}" srcOrd="0" destOrd="0" presId="urn:microsoft.com/office/officeart/2005/8/layout/process1"/>
-    <dgm:cxn modelId="{EFDD5FC7-90A1-441B-BDCC-97F0E404D852}" srcId="{9778B2AF-6EE1-4E17-B9AA-D2699DBDE648}" destId="{6F121CE4-2F44-4771-8CDD-9F34CC46D152}" srcOrd="0" destOrd="0" parTransId="{B7993B56-BB37-40E2-B67D-04080561C157}" sibTransId="{DB724159-90F2-4184-BA18-7CA8CA0FE469}"/>
-    <dgm:cxn modelId="{A55358FD-6475-48C2-AFC2-8D23D66DCE1A}" type="presOf" srcId="{C9858D0F-31A7-4E5D-B415-1CC9C3DA2931}" destId="{29E73685-2DCE-44FC-B8A6-5402DAD439AC}" srcOrd="0" destOrd="0" presId="urn:microsoft.com/office/officeart/2005/8/layout/process1"/>
-    <dgm:cxn modelId="{24E3ED7C-D6A6-4F89-9E02-CDC50FA7DA9B}" srcId="{9778B2AF-6EE1-4E17-B9AA-D2699DBDE648}" destId="{675AC71D-A21A-45B2-9800-7B2606181B4E}" srcOrd="1" destOrd="0" parTransId="{436C6FE4-D546-48B0-8295-80966DDFC2CB}" sibTransId="{A713D569-3E22-425B-B49E-AD50A08CA262}"/>
-    <dgm:cxn modelId="{4C4D9E9C-25D4-473B-8E94-8ECC51ADEF7C}" type="presOf" srcId="{A713D569-3E22-425B-B49E-AD50A08CA262}" destId="{1F3CA1AF-5A36-4EA7-979A-CDE66C2D9DA8}" srcOrd="0" destOrd="0" presId="urn:microsoft.com/office/officeart/2005/8/layout/process1"/>
     <dgm:cxn modelId="{51FD3598-F84B-46F3-AF3E-E78DB6AA7C78}" type="presParOf" srcId="{C1C8B983-A91C-40B0-AA22-24B5A517ACC7}" destId="{6F5EE12A-110A-4614-8F60-BE5160D6B65A}" srcOrd="0" destOrd="0" presId="urn:microsoft.com/office/officeart/2005/8/layout/process1"/>
     <dgm:cxn modelId="{A72344C8-9427-4358-9719-DB1B7ED27B76}" type="presParOf" srcId="{C1C8B983-A91C-40B0-AA22-24B5A517ACC7}" destId="{E4FCC6C0-D3B3-4A69-A538-E99289A5F274}" srcOrd="1" destOrd="0" presId="urn:microsoft.com/office/officeart/2005/8/layout/process1"/>
     <dgm:cxn modelId="{92F6FE73-BEDC-408D-8C70-9F49ADA1DC72}" type="presParOf" srcId="{E4FCC6C0-D3B3-4A69-A538-E99289A5F274}" destId="{8B7D0674-F626-4FB2-B1BB-2BEC95EBE3A8}" srcOrd="0" destOrd="0" presId="urn:microsoft.com/office/officeart/2005/8/layout/process1"/>
@@ -1403,11 +1465,7 @@
           </a:r>
           <a:r>
             <a:rPr lang="en-US" sz="2300" b="1" kern="1200" dirty="0" smtClean="0"/>
-            <a:t> </a:t>
-          </a:r>
-          <a:r>
-            <a:rPr lang="en-US" sz="2300" b="1" kern="1200" dirty="0" smtClean="0"/>
-            <a:t>or </a:t>
+            <a:t> or </a:t>
           </a:r>
           <a:r>
             <a:rPr lang="en-US" sz="2300" b="1" kern="1200" dirty="0" err="1" smtClean="0"/>
@@ -1415,11 +1473,7 @@
           </a:r>
           <a:r>
             <a:rPr lang="en-US" sz="2300" b="1" kern="1200" dirty="0" smtClean="0"/>
-            <a:t> via </a:t>
-          </a:r>
-          <a:r>
-            <a:rPr lang="en-US" sz="2300" b="1" kern="1200" dirty="0" smtClean="0"/>
-            <a:t>their APIs</a:t>
+            <a:t> via their APIs</a:t>
           </a:r>
           <a:endParaRPr lang="en-US" sz="2300" b="1" kern="1200" dirty="0"/>
         </a:p>
@@ -6061,21 +6115,7 @@
                 <a:latin typeface="+mj-lt"/>
                 <a:cs typeface="Helvetica" pitchFamily="34" charset="0"/>
               </a:rPr>
-              <a:t> </a:t>
-            </a:r>
-            <a:r>
-              <a:rPr kumimoji="0" lang="en-US" sz="2600" b="0" i="0" u="none" strike="noStrike" cap="none" normalizeH="0" dirty="0" smtClean="0">
-                <a:ln>
-                  <a:noFill/>
-                </a:ln>
-                <a:solidFill>
-                  <a:schemeClr val="tx1"/>
-                </a:solidFill>
-                <a:effectLst/>
-                <a:latin typeface="+mj-lt"/>
-                <a:cs typeface="Helvetica" pitchFamily="34" charset="0"/>
-              </a:rPr>
-              <a:t>only takes a few cents for a query</a:t>
+              <a:t> only takes a few cents for a query</a:t>
             </a:r>
           </a:p>
           <a:p>
@@ -6136,7 +6176,14 @@
                 <a:latin typeface="+mj-lt"/>
                 <a:cs typeface="Helvetica" pitchFamily="34" charset="0"/>
               </a:rPr>
-              <a:t>Having a separate secretary is unnecessary when only a few tasks are needed done</a:t>
+              <a:t>Having a separate secretary is unnecessary when only a few tasks are </a:t>
+            </a:r>
+            <a:r>
+              <a:rPr lang="en-US" sz="2600" dirty="0" smtClean="0">
+                <a:latin typeface="+mj-lt"/>
+                <a:cs typeface="Helvetica" pitchFamily="34" charset="0"/>
+              </a:rPr>
+              <a:t>needed</a:t>
             </a:r>
           </a:p>
           <a:p>
@@ -6161,7 +6208,14 @@
                 <a:latin typeface="+mj-lt"/>
                 <a:cs typeface="Helvetica" pitchFamily="34" charset="0"/>
               </a:rPr>
-              <a:t>Normal Secretaries have to sleep at night</a:t>
+              <a:t>Normal secretaries </a:t>
+            </a:r>
+            <a:r>
+              <a:rPr lang="en-US" sz="2600" dirty="0" smtClean="0">
+                <a:latin typeface="+mj-lt"/>
+                <a:cs typeface="Helvetica" pitchFamily="34" charset="0"/>
+              </a:rPr>
+              <a:t>have to sleep at night</a:t>
             </a:r>
           </a:p>
           <a:p>
@@ -6318,19 +6372,8 @@
                 <a:latin typeface="+mj-lt"/>
                 <a:cs typeface="Helvetica" pitchFamily="34" charset="0"/>
               </a:rPr>
-              <a:t>Search engines can only solve a subset of data-retrieval problems (i.e... Once again need extensive context to function properly</a:t>
-            </a:r>
-            <a:r>
-              <a:rPr lang="en-US" sz="2600" dirty="0" smtClean="0">
-                <a:latin typeface="+mj-lt"/>
-                <a:cs typeface="Helvetica" pitchFamily="34" charset="0"/>
-              </a:rPr>
-              <a:t>)</a:t>
-            </a:r>
-            <a:endParaRPr lang="en-US" sz="2600" dirty="0" smtClean="0">
-              <a:latin typeface="+mj-lt"/>
-              <a:cs typeface="Helvetica" pitchFamily="34" charset="0"/>
-            </a:endParaRPr>
+              <a:t>Search engines can only solve a subset of data-retrieval problems (i.e... Once again need extensive context to function properly)</a:t>
+            </a:r>
           </a:p>
         </p:txBody>
       </p:sp>
@@ -6490,7 +6533,21 @@
                 <a:latin typeface="+mj-lt"/>
                 <a:cs typeface="Helvetica" pitchFamily="34" charset="0"/>
               </a:rPr>
-              <a:t>Users can add  resources for the worker instance to reference</a:t>
+              <a:t>Users can add </a:t>
+            </a:r>
+            <a:r>
+              <a:rPr lang="en-US" sz="2600" dirty="0" smtClean="0">
+                <a:latin typeface="+mj-lt"/>
+                <a:cs typeface="Helvetica" pitchFamily="34" charset="0"/>
+              </a:rPr>
+              <a:t>resources </a:t>
+            </a:r>
+            <a:r>
+              <a:rPr lang="en-US" sz="2600" dirty="0" smtClean="0">
+                <a:latin typeface="+mj-lt"/>
+                <a:cs typeface="Helvetica" pitchFamily="34" charset="0"/>
+              </a:rPr>
+              <a:t>for the worker instance to reference</a:t>
             </a:r>
           </a:p>
           <a:p>
@@ -6515,7 +6572,21 @@
                 <a:latin typeface="+mj-lt"/>
                 <a:cs typeface="Helvetica" pitchFamily="34" charset="0"/>
               </a:rPr>
-              <a:t>If the user wants to upload a file to refer to, there is a field to upload a  file for the worker to reference</a:t>
+              <a:t>If the user wants to upload a file to refer to, there is a field to upload a </a:t>
+            </a:r>
+            <a:r>
+              <a:rPr lang="en-US" sz="2600" dirty="0" smtClean="0">
+                <a:latin typeface="+mj-lt"/>
+                <a:cs typeface="Helvetica" pitchFamily="34" charset="0"/>
+              </a:rPr>
+              <a:t>file </a:t>
+            </a:r>
+            <a:r>
+              <a:rPr lang="en-US" sz="2600" dirty="0" smtClean="0">
+                <a:latin typeface="+mj-lt"/>
+                <a:cs typeface="Helvetica" pitchFamily="34" charset="0"/>
+              </a:rPr>
+              <a:t>for the worker to reference</a:t>
             </a:r>
           </a:p>
           <a:p>
@@ -6565,19 +6636,8 @@
                 <a:latin typeface="+mj-lt"/>
                 <a:cs typeface="Helvetica" pitchFamily="34" charset="0"/>
               </a:rPr>
-              <a:t>Worker can access the users profile (and Facebook information if provided) as additional resources for customized task </a:t>
-            </a:r>
-            <a:r>
-              <a:rPr lang="en-US" sz="2600" dirty="0" smtClean="0">
-                <a:latin typeface="+mj-lt"/>
-                <a:cs typeface="Helvetica" pitchFamily="34" charset="0"/>
-              </a:rPr>
-              <a:t>completions</a:t>
-            </a:r>
-            <a:endParaRPr lang="en-US" sz="2600" dirty="0" smtClean="0">
-              <a:latin typeface="+mj-lt"/>
-              <a:cs typeface="Helvetica" pitchFamily="34" charset="0"/>
-            </a:endParaRPr>
+              <a:t>Worker can access the users profile (and Facebook information if provided) as additional resources for customized task completions</a:t>
+            </a:r>
           </a:p>
         </p:txBody>
       </p:sp>
@@ -6692,21 +6752,7 @@
                 <a:latin typeface="+mj-lt"/>
                 <a:cs typeface="Helvetica" pitchFamily="34" charset="0"/>
               </a:rPr>
-              <a:t>Platforms </a:t>
-            </a:r>
-            <a:r>
-              <a:rPr kumimoji="0" lang="en-US" sz="2600" b="1" i="0" u="none" strike="noStrike" cap="none" normalizeH="0" baseline="0" dirty="0" smtClean="0">
-                <a:ln>
-                  <a:noFill/>
-                </a:ln>
-                <a:solidFill>
-                  <a:schemeClr val="tx1"/>
-                </a:solidFill>
-                <a:effectLst/>
-                <a:latin typeface="+mj-lt"/>
-                <a:cs typeface="Helvetica" pitchFamily="34" charset="0"/>
-              </a:rPr>
-              <a:t>that perform</a:t>
+              <a:t>Platforms that perform</a:t>
             </a:r>
             <a:r>
               <a:rPr kumimoji="0" lang="en-US" sz="2600" b="1" i="0" u="none" strike="noStrike" cap="none" normalizeH="0" dirty="0" smtClean="0">
@@ -6844,14 +6890,7 @@
                 <a:latin typeface="+mj-lt"/>
                 <a:cs typeface="Helvetica" pitchFamily="34" charset="0"/>
               </a:rPr>
-              <a:t>Platforms </a:t>
-            </a:r>
-            <a:r>
-              <a:rPr lang="en-US" sz="2600" b="1" dirty="0" smtClean="0">
-                <a:latin typeface="+mj-lt"/>
-                <a:cs typeface="Helvetica" pitchFamily="34" charset="0"/>
-              </a:rPr>
-              <a:t>that let users perform structured tasks</a:t>
+              <a:t>Platforms that let users perform structured tasks</a:t>
             </a:r>
           </a:p>
           <a:p>
@@ -6872,12 +6911,16 @@
               <a:tabLst/>
             </a:pPr>
             <a:r>
-              <a:rPr lang="en-US" sz="2600" dirty="0" smtClean="0">
+              <a:rPr lang="en-US" sz="2600" dirty="0" err="1" smtClean="0">
                 <a:latin typeface="+mj-lt"/>
                 <a:cs typeface="Helvetica" pitchFamily="34" charset="0"/>
               </a:rPr>
-              <a:t>Crowd flower</a:t>
-            </a:r>
+              <a:t>CrowdFlower</a:t>
+            </a:r>
+            <a:endParaRPr lang="en-US" sz="2600" dirty="0" smtClean="0">
+              <a:latin typeface="+mj-lt"/>
+              <a:cs typeface="Helvetica" pitchFamily="34" charset="0"/>
+            </a:endParaRPr>
           </a:p>
           <a:p>
             <a:pPr marL="283464" marR="157163" lvl="0" indent="-283464" defTabSz="914400" rtl="0" eaLnBrk="1" fontAlgn="base" latinLnBrk="0" hangingPunct="1">
@@ -7011,14 +7054,7 @@
                 <a:latin typeface="+mj-lt"/>
                 <a:cs typeface="Helvetica" pitchFamily="34" charset="0"/>
               </a:rPr>
-              <a:t>Peer-to-peer Task </a:t>
-            </a:r>
-            <a:r>
-              <a:rPr lang="en-US" sz="2600" b="1" dirty="0" smtClean="0">
-                <a:latin typeface="+mj-lt"/>
-                <a:cs typeface="Helvetica" pitchFamily="34" charset="0"/>
-              </a:rPr>
-              <a:t>Delegation Platforms</a:t>
+              <a:t>Peer-to-peer Task Delegation Platforms</a:t>
             </a:r>
           </a:p>
           <a:p>
@@ -7101,7 +7137,7 @@
                 <a:latin typeface="+mj-lt"/>
                 <a:cs typeface="Helvetica" pitchFamily="34" charset="0"/>
               </a:rPr>
-              <a:t>StudentOffortune</a:t>
+              <a:t>StudentOfFortune</a:t>
             </a:r>
             <a:endParaRPr lang="en-US" sz="2600" b="1" dirty="0">
               <a:latin typeface="+mj-lt"/>
@@ -7943,7 +7979,14 @@
                 <a:latin typeface="+mj-lt"/>
                 <a:cs typeface="Helvetica" pitchFamily="34" charset="0"/>
               </a:rPr>
-              <a:t>Make Massively Scalable and increase </a:t>
+              <a:t>Make Massively Scalable and </a:t>
+            </a:r>
+            <a:r>
+              <a:rPr lang="en-US" sz="2500" dirty="0" smtClean="0">
+                <a:latin typeface="+mj-lt"/>
+                <a:cs typeface="Helvetica" pitchFamily="34" charset="0"/>
+              </a:rPr>
+              <a:t>Increase </a:t>
             </a:r>
             <a:r>
               <a:rPr lang="en-US" sz="2500" dirty="0" err="1" smtClean="0">
@@ -8468,10 +8511,6 @@
               </a:rPr>
               <a:t>iterations</a:t>
             </a:r>
-            <a:endParaRPr lang="en-US" sz="2600" dirty="0" smtClean="0">
-              <a:latin typeface="+mj-lt"/>
-              <a:cs typeface="Helvetica" pitchFamily="34" charset="0"/>
-            </a:endParaRPr>
           </a:p>
         </p:txBody>
       </p:sp>
@@ -8628,14 +8667,7 @@
                 <a:latin typeface="+mj-lt"/>
                 <a:cs typeface="Helvetica" pitchFamily="34" charset="0"/>
               </a:rPr>
-              <a:t>Enterprise (Thi</a:t>
-            </a:r>
-            <a:r>
-              <a:rPr lang="en-US" sz="2500" dirty="0" smtClean="0">
-                <a:latin typeface="+mj-lt"/>
-                <a:cs typeface="Helvetica" pitchFamily="34" charset="0"/>
-              </a:rPr>
-              <a:t>nk normal secretaries)</a:t>
+              <a:t>Enterprise (Think normal secretaries)</a:t>
             </a:r>
           </a:p>
           <a:p>
@@ -8798,10 +8830,6 @@
               </a:rPr>
               <a:t>Data Scientists</a:t>
             </a:r>
-            <a:endParaRPr lang="en-US" sz="2500" dirty="0" smtClean="0">
-              <a:latin typeface="+mj-lt"/>
-              <a:cs typeface="Helvetica" pitchFamily="34" charset="0"/>
-            </a:endParaRPr>
           </a:p>
           <a:p>
             <a:pPr marL="285750" indent="-285750" defTabSz="914400" fontAlgn="base">
@@ -8988,8 +9016,12 @@
                 <a:latin typeface="+mj-lt"/>
                 <a:cs typeface="Helvetica" pitchFamily="34" charset="0"/>
               </a:rPr>
-              <a:t>Medicine</a:t>
-            </a:r>
+              <a:t>Surveys</a:t>
+            </a:r>
+            <a:endParaRPr lang="en-US" sz="2500" dirty="0" smtClean="0">
+              <a:latin typeface="+mj-lt"/>
+              <a:cs typeface="Helvetica" pitchFamily="34" charset="0"/>
+            </a:endParaRPr>
           </a:p>
           <a:p>
             <a:pPr marL="285750" lvl="0" indent="-285750" defTabSz="914400" fontAlgn="base">
@@ -9005,7 +9037,7 @@
                 <a:latin typeface="+mj-lt"/>
                 <a:cs typeface="Helvetica" pitchFamily="34" charset="0"/>
               </a:rPr>
-              <a:t>Surveys</a:t>
+              <a:t>Looking up how to do small programming tasks</a:t>
             </a:r>
           </a:p>
           <a:p>
@@ -9022,7 +9054,7 @@
                 <a:latin typeface="+mj-lt"/>
                 <a:cs typeface="Helvetica" pitchFamily="34" charset="0"/>
               </a:rPr>
-              <a:t>Looking up how to do small programming tasks</a:t>
+              <a:t>Data Mining</a:t>
             </a:r>
           </a:p>
           <a:p>
@@ -9039,7 +9071,21 @@
                 <a:latin typeface="+mj-lt"/>
                 <a:cs typeface="Helvetica" pitchFamily="34" charset="0"/>
               </a:rPr>
-              <a:t>Data Mining</a:t>
+              <a:t>Geography- </a:t>
+            </a:r>
+            <a:r>
+              <a:rPr lang="en-US" sz="2500" dirty="0">
+                <a:latin typeface="+mj-lt"/>
+                <a:cs typeface="Helvetica" pitchFamily="34" charset="0"/>
+              </a:rPr>
+              <a:t>B</a:t>
+            </a:r>
+            <a:r>
+              <a:rPr lang="en-US" sz="2500" dirty="0" smtClean="0">
+                <a:latin typeface="+mj-lt"/>
+                <a:cs typeface="Helvetica" pitchFamily="34" charset="0"/>
+              </a:rPr>
+              <a:t>ased Recommendations</a:t>
             </a:r>
           </a:p>
           <a:p>
@@ -9056,21 +9102,7 @@
                 <a:latin typeface="+mj-lt"/>
                 <a:cs typeface="Helvetica" pitchFamily="34" charset="0"/>
               </a:rPr>
-              <a:t>Geography- </a:t>
-            </a:r>
-            <a:r>
-              <a:rPr lang="en-US" sz="2500" dirty="0">
-                <a:latin typeface="+mj-lt"/>
-                <a:cs typeface="Helvetica" pitchFamily="34" charset="0"/>
-              </a:rPr>
-              <a:t>B</a:t>
-            </a:r>
-            <a:r>
-              <a:rPr lang="en-US" sz="2500" dirty="0" smtClean="0">
-                <a:latin typeface="+mj-lt"/>
-                <a:cs typeface="Helvetica" pitchFamily="34" charset="0"/>
-              </a:rPr>
-              <a:t>ased Recommendations</a:t>
+              <a:t>Writing  Papers</a:t>
             </a:r>
           </a:p>
           <a:p>
@@ -9087,7 +9119,7 @@
                 <a:latin typeface="+mj-lt"/>
                 <a:cs typeface="Helvetica" pitchFamily="34" charset="0"/>
               </a:rPr>
-              <a:t>Writing  Papers</a:t>
+              <a:t>Converting Pseudo-Code to statistically correct  implementations</a:t>
             </a:r>
           </a:p>
           <a:p>
@@ -9104,11 +9136,11 @@
                 <a:latin typeface="+mj-lt"/>
                 <a:cs typeface="Helvetica" pitchFamily="34" charset="0"/>
               </a:rPr>
-              <a:t>Converting Pseudo-Code to statistically correct  implementations</a:t>
-            </a:r>
-          </a:p>
-          <a:p>
-            <a:pPr marL="285750" lvl="0" indent="-285750" defTabSz="914400" fontAlgn="base">
+              <a:t>OCR</a:t>
+            </a:r>
+          </a:p>
+          <a:p>
+            <a:pPr marL="285750" indent="-285750" defTabSz="914400" fontAlgn="base">
               <a:spcBef>
                 <a:spcPct val="0"/>
               </a:spcBef>
@@ -9121,11 +9153,18 @@
                 <a:latin typeface="+mj-lt"/>
                 <a:cs typeface="Helvetica" pitchFamily="34" charset="0"/>
               </a:rPr>
-              <a:t>OCR</a:t>
-            </a:r>
-          </a:p>
-          <a:p>
-            <a:pPr marL="285750" lvl="0" indent="-285750" defTabSz="914400" fontAlgn="base">
+              <a:t>Media </a:t>
+            </a:r>
+            <a:r>
+              <a:rPr lang="en-US" sz="2500" dirty="0" smtClean="0">
+                <a:latin typeface="+mj-lt"/>
+                <a:cs typeface="Helvetica" pitchFamily="34" charset="0"/>
+              </a:rPr>
+              <a:t>Collection</a:t>
+            </a:r>
+          </a:p>
+          <a:p>
+            <a:pPr marL="285750" indent="-285750" defTabSz="914400" fontAlgn="base">
               <a:spcBef>
                 <a:spcPct val="0"/>
               </a:spcBef>
@@ -9135,11 +9174,23 @@
             </a:pPr>
             <a:r>
               <a:rPr lang="en-US" sz="2500" dirty="0" smtClean="0">
-                <a:latin typeface="+mj-lt"/>
                 <a:cs typeface="Helvetica" pitchFamily="34" charset="0"/>
               </a:rPr>
-              <a:t>Media Collection</a:t>
-            </a:r>
+              <a:t>Medicine</a:t>
+            </a:r>
+            <a:endParaRPr lang="en-US" sz="2500" dirty="0">
+              <a:cs typeface="Helvetica" pitchFamily="34" charset="0"/>
+            </a:endParaRPr>
+          </a:p>
+          <a:p>
+            <a:pPr marL="285750" lvl="0" indent="-285750" defTabSz="914400" fontAlgn="base">
+              <a:spcBef>
+                <a:spcPct val="0"/>
+              </a:spcBef>
+              <a:buSzPts val="2600"/>
+              <a:buFont typeface="Arial" pitchFamily="34" charset="0"/>
+              <a:buChar char="•"/>
+            </a:pPr>
             <a:endParaRPr lang="en-US" sz="2500" dirty="0" smtClean="0">
               <a:latin typeface="+mj-lt"/>
               <a:cs typeface="Helvetica" pitchFamily="34" charset="0"/>

</xml_diff>